<commit_message>
Update CS412 - final project presentation TSP .pptx
</commit_message>
<xml_diff>
--- a/problem_presentation/CS412 - final project presentation TSP .pptx
+++ b/problem_presentation/CS412 - final project presentation TSP .pptx
@@ -12814,7 +12814,7 @@
         <p:spPr>
           <a:xfrm>
             <a:off x="932089" y="2051131"/>
-            <a:ext cx="7279821" cy="2246769"/>
+            <a:ext cx="7279821" cy="1600438"/>
           </a:xfrm>
           <a:prstGeom prst="rect">
             <a:avLst/>
@@ -12932,27 +12932,6 @@
               </a:rPr>
               <a:t>Output: YES if there exists a tour with total cost ≤ k, NO otherwise</a:t>
             </a:r>
-          </a:p>
-          <a:p>
-            <a:pPr marL="285750" lvl="1" indent="-285750">
-              <a:buFont typeface="Arial" panose="020B0604020202020204" pitchFamily="34" charset="0"/>
-              <a:buChar char="•"/>
-            </a:pPr>
-            <a:r>
-              <a:rPr lang="en-US" dirty="0">
-                <a:latin typeface="Calibri" panose="020F0502020204030204" pitchFamily="34" charset="0"/>
-                <a:ea typeface="Calibri" panose="020F0502020204030204" pitchFamily="34" charset="0"/>
-                <a:cs typeface="Calibri" panose="020F0502020204030204" pitchFamily="34" charset="0"/>
-              </a:rPr>
-              <a:t>This is the version used to prove NP-completeness</a:t>
-            </a:r>
-            <a:br>
-              <a:rPr lang="en-US" dirty="0"/>
-            </a:br>
-            <a:endParaRPr lang="en-US" dirty="0"/>
-          </a:p>
-          <a:p>
-            <a:endParaRPr lang="en-US" dirty="0"/>
           </a:p>
         </p:txBody>
       </p:sp>

</xml_diff>